<commit_message>
docs: update industry decks with forecasting — business-friendly + technical appendix
Replace technical PST/Hawkes/Conformal jargon with plain-language forecasting
slides showing probability progression for each industry:
- Cyber: "Predict Attacks Before They Complete" (kill chain stages)
- Finance: "Block Fraud Before the Final Transaction" (card testing)
- Healthcare: "Predict Deterioration Before It Becomes Critical" (vitals)

Technical deep dive moved to appendix slides for advanced audiences.
VPL examples updated with .forecast() and merged .where() using 'and'.

Co-Authored-By: Claude Opus 4.6 <noreply@anthropic.com>
</commit_message>
<xml_diff>
--- a/presentations/Varpulis_Cybersecurity.pptx
+++ b/presentations/Varpulis_Cybersecurity.pptx
@@ -15,6 +15,7 @@
     <p:sldId id="263" r:id="rId14"/>
     <p:sldId id="264" r:id="rId15"/>
     <p:sldId id="265" r:id="rId16"/>
+    <p:sldId id="266" r:id="rId17"/>
   </p:sldIdLst>
   <p:sldSz cx="9144000" cy="6858000" type="screen4x3"/>
   <p:notesSz cx="6858000" cy="9144000"/>
@@ -3603,6 +3604,1022 @@
 </p:sld>
 </file>
 
+<file path=ppt/slides/slide11.xml><?xml version="1.0" encoding="utf-8"?>
+<p:sld xmlns:a="http://schemas.openxmlformats.org/drawingml/2006/main" xmlns:p="http://schemas.openxmlformats.org/presentationml/2006/main" xmlns:r="http://schemas.openxmlformats.org/officeDocument/2006/relationships">
+  <p:cSld>
+    <p:bg>
+      <p:bgPr>
+        <a:solidFill>
+          <a:srgbClr val="0D1B2A"/>
+        </a:solidFill>
+        <a:effectLst/>
+      </p:bgPr>
+    </p:bg>
+    <p:spTree>
+      <p:nvGrpSpPr>
+        <p:cNvPr id="1" name=""/>
+        <p:cNvGrpSpPr/>
+        <p:nvPr/>
+      </p:nvGrpSpPr>
+      <p:grpSpPr/>
+      <p:sp>
+        <p:nvSpPr>
+          <p:cNvPr id="2" name="Rectangle 1"/>
+          <p:cNvSpPr/>
+          <p:nvPr/>
+        </p:nvSpPr>
+        <p:spPr>
+          <a:xfrm>
+            <a:off x="0" y="0"/>
+            <a:ext cx="9144000" cy="36576"/>
+          </a:xfrm>
+          <a:prstGeom prst="rect">
+            <a:avLst/>
+          </a:prstGeom>
+          <a:solidFill>
+            <a:srgbClr val="00B4D8"/>
+          </a:solidFill>
+          <a:ln>
+            <a:noFill/>
+          </a:ln>
+        </p:spPr>
+        <p:style>
+          <a:lnRef idx="1">
+            <a:schemeClr val="accent1"/>
+          </a:lnRef>
+          <a:fillRef idx="3">
+            <a:schemeClr val="accent1"/>
+          </a:fillRef>
+          <a:effectRef idx="2">
+            <a:schemeClr val="accent1"/>
+          </a:effectRef>
+          <a:fontRef idx="minor">
+            <a:schemeClr val="lt1"/>
+          </a:fontRef>
+        </p:style>
+        <p:txBody>
+          <a:bodyPr rtlCol="0" anchor="ctr"/>
+          <a:lstStyle/>
+          <a:p>
+            <a:pPr algn="ctr"/>
+          </a:p>
+        </p:txBody>
+      </p:sp>
+      <p:sp>
+        <p:nvSpPr>
+          <p:cNvPr id="3" name="TextBox 2"/>
+          <p:cNvSpPr txBox="1"/>
+          <p:nvPr/>
+        </p:nvSpPr>
+        <p:spPr>
+          <a:xfrm>
+            <a:off x="548640" y="137160"/>
+            <a:ext cx="2743200" cy="320040"/>
+          </a:xfrm>
+          <a:prstGeom prst="rect">
+            <a:avLst/>
+          </a:prstGeom>
+          <a:noFill/>
+        </p:spPr>
+        <p:txBody>
+          <a:bodyPr wrap="square">
+            <a:spAutoFit/>
+          </a:bodyPr>
+          <a:lstStyle/>
+          <a:p>
+            <a:pPr algn="l"/>
+            <a:r>
+              <a:rPr sz="1800" b="1">
+                <a:solidFill>
+                  <a:srgbClr val="00B4D8"/>
+                </a:solidFill>
+                <a:latin typeface="Calibri"/>
+              </a:rPr>
+              <a:t>VARPULIS</a:t>
+            </a:r>
+          </a:p>
+        </p:txBody>
+      </p:sp>
+      <p:sp>
+        <p:nvSpPr>
+          <p:cNvPr id="4" name="Rectangle 3"/>
+          <p:cNvSpPr/>
+          <p:nvPr/>
+        </p:nvSpPr>
+        <p:spPr>
+          <a:xfrm>
+            <a:off x="0" y="6821424"/>
+            <a:ext cx="9144000" cy="36576"/>
+          </a:xfrm>
+          <a:prstGeom prst="rect">
+            <a:avLst/>
+          </a:prstGeom>
+          <a:solidFill>
+            <a:srgbClr val="00B4D8"/>
+          </a:solidFill>
+          <a:ln>
+            <a:noFill/>
+          </a:ln>
+        </p:spPr>
+        <p:style>
+          <a:lnRef idx="1">
+            <a:schemeClr val="accent1"/>
+          </a:lnRef>
+          <a:fillRef idx="3">
+            <a:schemeClr val="accent1"/>
+          </a:fillRef>
+          <a:effectRef idx="2">
+            <a:schemeClr val="accent1"/>
+          </a:effectRef>
+          <a:fontRef idx="minor">
+            <a:schemeClr val="lt1"/>
+          </a:fontRef>
+        </p:style>
+        <p:txBody>
+          <a:bodyPr rtlCol="0" anchor="ctr"/>
+          <a:lstStyle/>
+          <a:p>
+            <a:pPr algn="ctr"/>
+          </a:p>
+        </p:txBody>
+      </p:sp>
+      <p:sp>
+        <p:nvSpPr>
+          <p:cNvPr id="5" name="TextBox 4"/>
+          <p:cNvSpPr txBox="1"/>
+          <p:nvPr/>
+        </p:nvSpPr>
+        <p:spPr>
+          <a:xfrm>
+            <a:off x="548640" y="457200"/>
+            <a:ext cx="7772400" cy="548640"/>
+          </a:xfrm>
+          <a:prstGeom prst="rect">
+            <a:avLst/>
+          </a:prstGeom>
+          <a:noFill/>
+        </p:spPr>
+        <p:txBody>
+          <a:bodyPr wrap="square">
+            <a:spAutoFit/>
+          </a:bodyPr>
+          <a:lstStyle/>
+          <a:p>
+            <a:pPr algn="l"/>
+            <a:r>
+              <a:rPr sz="2400" b="1">
+                <a:solidFill>
+                  <a:srgbClr val="FFFFFF"/>
+                </a:solidFill>
+                <a:latin typeface="Calibri"/>
+              </a:rPr>
+              <a:t>Appendix: Forecasting Engine Deep Dive</a:t>
+            </a:r>
+          </a:p>
+        </p:txBody>
+      </p:sp>
+      <p:sp>
+        <p:nvSpPr>
+          <p:cNvPr id="6" name="Rectangle 5"/>
+          <p:cNvSpPr/>
+          <p:nvPr/>
+        </p:nvSpPr>
+        <p:spPr>
+          <a:xfrm>
+            <a:off x="548640" y="914400"/>
+            <a:ext cx="1371600" cy="25400"/>
+          </a:xfrm>
+          <a:prstGeom prst="rect">
+            <a:avLst/>
+          </a:prstGeom>
+          <a:solidFill>
+            <a:srgbClr val="00B4D8"/>
+          </a:solidFill>
+          <a:ln>
+            <a:noFill/>
+          </a:ln>
+        </p:spPr>
+        <p:style>
+          <a:lnRef idx="1">
+            <a:schemeClr val="accent1"/>
+          </a:lnRef>
+          <a:fillRef idx="3">
+            <a:schemeClr val="accent1"/>
+          </a:fillRef>
+          <a:effectRef idx="2">
+            <a:schemeClr val="accent1"/>
+          </a:effectRef>
+          <a:fontRef idx="minor">
+            <a:schemeClr val="lt1"/>
+          </a:fontRef>
+        </p:style>
+        <p:txBody>
+          <a:bodyPr rtlCol="0" anchor="ctr"/>
+          <a:lstStyle/>
+          <a:p>
+            <a:pPr algn="ctr"/>
+          </a:p>
+        </p:txBody>
+      </p:sp>
+      <p:sp>
+        <p:nvSpPr>
+          <p:cNvPr id="7" name="Rectangle 6"/>
+          <p:cNvSpPr/>
+          <p:nvPr/>
+        </p:nvSpPr>
+        <p:spPr>
+          <a:xfrm>
+            <a:off x="548640" y="1051560"/>
+            <a:ext cx="2468880" cy="25400"/>
+          </a:xfrm>
+          <a:prstGeom prst="rect">
+            <a:avLst/>
+          </a:prstGeom>
+          <a:solidFill>
+            <a:srgbClr val="FF6B35"/>
+          </a:solidFill>
+          <a:ln>
+            <a:noFill/>
+          </a:ln>
+        </p:spPr>
+        <p:style>
+          <a:lnRef idx="1">
+            <a:schemeClr val="accent1"/>
+          </a:lnRef>
+          <a:fillRef idx="3">
+            <a:schemeClr val="accent1"/>
+          </a:fillRef>
+          <a:effectRef idx="2">
+            <a:schemeClr val="accent1"/>
+          </a:effectRef>
+          <a:fontRef idx="minor">
+            <a:schemeClr val="lt1"/>
+          </a:fontRef>
+        </p:style>
+        <p:txBody>
+          <a:bodyPr rtlCol="0" anchor="ctr"/>
+          <a:lstStyle/>
+          <a:p>
+            <a:pPr algn="ctr"/>
+          </a:p>
+        </p:txBody>
+      </p:sp>
+      <p:sp>
+        <p:nvSpPr>
+          <p:cNvPr id="8" name="TextBox 7"/>
+          <p:cNvSpPr txBox="1"/>
+          <p:nvPr/>
+        </p:nvSpPr>
+        <p:spPr>
+          <a:xfrm>
+            <a:off x="548640" y="1120140"/>
+            <a:ext cx="2468880" cy="274320"/>
+          </a:xfrm>
+          <a:prstGeom prst="rect">
+            <a:avLst/>
+          </a:prstGeom>
+          <a:noFill/>
+        </p:spPr>
+        <p:txBody>
+          <a:bodyPr wrap="square">
+            <a:spAutoFit/>
+          </a:bodyPr>
+          <a:lstStyle/>
+          <a:p>
+            <a:pPr algn="l"/>
+            <a:r>
+              <a:rPr sz="1100" b="1">
+                <a:solidFill>
+                  <a:srgbClr val="FF6B35"/>
+                </a:solidFill>
+                <a:latin typeface="Calibri"/>
+              </a:rPr>
+              <a:t>PREDICTION SUFFIX TREE</a:t>
+            </a:r>
+          </a:p>
+        </p:txBody>
+      </p:sp>
+      <p:sp>
+        <p:nvSpPr>
+          <p:cNvPr id="9" name="TextBox 8"/>
+          <p:cNvSpPr txBox="1"/>
+          <p:nvPr/>
+        </p:nvSpPr>
+        <p:spPr>
+          <a:xfrm>
+            <a:off x="548640" y="1371600"/>
+            <a:ext cx="2468880" cy="3200400"/>
+          </a:xfrm>
+          <a:prstGeom prst="rect">
+            <a:avLst/>
+          </a:prstGeom>
+          <a:noFill/>
+        </p:spPr>
+        <p:txBody>
+          <a:bodyPr wrap="square">
+            <a:spAutoFit/>
+          </a:bodyPr>
+          <a:lstStyle/>
+          <a:p>
+            <a:pPr>
+              <a:spcAft>
+                <a:spcPts val="600"/>
+              </a:spcAft>
+            </a:pPr>
+            <a:r>
+              <a:rPr sz="1100">
+                <a:solidFill>
+                  <a:srgbClr val="FF6B35"/>
+                </a:solidFill>
+                <a:latin typeface="Calibri"/>
+              </a:rPr>
+              <a:t>▸ </a:t>
+            </a:r>
+            <a:r>
+              <a:rPr sz="1100">
+                <a:solidFill>
+                  <a:srgbClr val="B0C4DE"/>
+                </a:solidFill>
+                <a:latin typeface="Calibri"/>
+              </a:rPr>
+              <a:t>Variable-depth Markov model</a:t>
+            </a:r>
+          </a:p>
+          <a:p>
+            <a:pPr>
+              <a:spcAft>
+                <a:spcPts val="600"/>
+              </a:spcAft>
+            </a:pPr>
+            <a:r>
+              <a:rPr sz="1100">
+                <a:solidFill>
+                  <a:srgbClr val="FF6B35"/>
+                </a:solidFill>
+                <a:latin typeface="Calibri"/>
+              </a:rPr>
+              <a:t>▸ </a:t>
+            </a:r>
+            <a:r>
+              <a:rPr sz="1100">
+                <a:solidFill>
+                  <a:srgbClr val="B0C4DE"/>
+                </a:solidFill>
+                <a:latin typeface="Calibri"/>
+              </a:rPr>
+              <a:t>Learns transition probabilities from the event stream</a:t>
+            </a:r>
+          </a:p>
+          <a:p>
+            <a:pPr>
+              <a:spcAft>
+                <a:spcPts val="600"/>
+              </a:spcAft>
+            </a:pPr>
+            <a:r>
+              <a:rPr sz="1100">
+                <a:solidFill>
+                  <a:srgbClr val="FF6B35"/>
+                </a:solidFill>
+                <a:latin typeface="Calibri"/>
+              </a:rPr>
+              <a:t>▸ </a:t>
+            </a:r>
+            <a:r>
+              <a:rPr sz="1100">
+                <a:solidFill>
+                  <a:srgbClr val="B0C4DE"/>
+                </a:solidFill>
+                <a:latin typeface="Calibri"/>
+              </a:rPr>
+              <a:t>Adapts context depth to data — deeper only where statistically significant</a:t>
+            </a:r>
+          </a:p>
+          <a:p>
+            <a:pPr>
+              <a:spcAft>
+                <a:spcPts val="600"/>
+              </a:spcAft>
+            </a:pPr>
+            <a:r>
+              <a:rPr sz="1100">
+                <a:solidFill>
+                  <a:srgbClr val="FF6B35"/>
+                </a:solidFill>
+                <a:latin typeface="Calibri"/>
+              </a:rPr>
+              <a:t>▸ </a:t>
+            </a:r>
+            <a:r>
+              <a:rPr sz="1100">
+                <a:solidFill>
+                  <a:srgbClr val="B0C4DE"/>
+                </a:solidFill>
+                <a:latin typeface="Calibri"/>
+              </a:rPr>
+              <a:t>Combined with SASE NFA to form Pattern Markov Chain (PMC)</a:t>
+            </a:r>
+          </a:p>
+          <a:p>
+            <a:pPr>
+              <a:spcAft>
+                <a:spcPts val="600"/>
+              </a:spcAft>
+            </a:pPr>
+            <a:r>
+              <a:rPr sz="1100">
+                <a:solidFill>
+                  <a:srgbClr val="FF6B35"/>
+                </a:solidFill>
+                <a:latin typeface="Calibri"/>
+              </a:rPr>
+              <a:t>▸ </a:t>
+            </a:r>
+            <a:r>
+              <a:rPr sz="1100">
+                <a:solidFill>
+                  <a:srgbClr val="B0C4DE"/>
+                </a:solidFill>
+                <a:latin typeface="Calibri"/>
+              </a:rPr>
+              <a:t>51 ns per prediction</a:t>
+            </a:r>
+          </a:p>
+        </p:txBody>
+      </p:sp>
+      <p:sp>
+        <p:nvSpPr>
+          <p:cNvPr id="10" name="Rectangle 9"/>
+          <p:cNvSpPr/>
+          <p:nvPr/>
+        </p:nvSpPr>
+        <p:spPr>
+          <a:xfrm>
+            <a:off x="3291840" y="1051560"/>
+            <a:ext cx="2468880" cy="25400"/>
+          </a:xfrm>
+          <a:prstGeom prst="rect">
+            <a:avLst/>
+          </a:prstGeom>
+          <a:solidFill>
+            <a:srgbClr val="FF6B35"/>
+          </a:solidFill>
+          <a:ln>
+            <a:noFill/>
+          </a:ln>
+        </p:spPr>
+        <p:style>
+          <a:lnRef idx="1">
+            <a:schemeClr val="accent1"/>
+          </a:lnRef>
+          <a:fillRef idx="3">
+            <a:schemeClr val="accent1"/>
+          </a:fillRef>
+          <a:effectRef idx="2">
+            <a:schemeClr val="accent1"/>
+          </a:effectRef>
+          <a:fontRef idx="minor">
+            <a:schemeClr val="lt1"/>
+          </a:fontRef>
+        </p:style>
+        <p:txBody>
+          <a:bodyPr rtlCol="0" anchor="ctr"/>
+          <a:lstStyle/>
+          <a:p>
+            <a:pPr algn="ctr"/>
+          </a:p>
+        </p:txBody>
+      </p:sp>
+      <p:sp>
+        <p:nvSpPr>
+          <p:cNvPr id="11" name="TextBox 10"/>
+          <p:cNvSpPr txBox="1"/>
+          <p:nvPr/>
+        </p:nvSpPr>
+        <p:spPr>
+          <a:xfrm>
+            <a:off x="3291840" y="1120140"/>
+            <a:ext cx="2468880" cy="274320"/>
+          </a:xfrm>
+          <a:prstGeom prst="rect">
+            <a:avLst/>
+          </a:prstGeom>
+          <a:noFill/>
+        </p:spPr>
+        <p:txBody>
+          <a:bodyPr wrap="square">
+            <a:spAutoFit/>
+          </a:bodyPr>
+          <a:lstStyle/>
+          <a:p>
+            <a:pPr algn="l"/>
+            <a:r>
+              <a:rPr sz="1100" b="1">
+                <a:solidFill>
+                  <a:srgbClr val="FF6B35"/>
+                </a:solidFill>
+                <a:latin typeface="Calibri"/>
+              </a:rPr>
+              <a:t>HAWKES PROCESS</a:t>
+            </a:r>
+          </a:p>
+        </p:txBody>
+      </p:sp>
+      <p:sp>
+        <p:nvSpPr>
+          <p:cNvPr id="12" name="TextBox 11"/>
+          <p:cNvSpPr txBox="1"/>
+          <p:nvPr/>
+        </p:nvSpPr>
+        <p:spPr>
+          <a:xfrm>
+            <a:off x="3291840" y="1371600"/>
+            <a:ext cx="2468880" cy="3200400"/>
+          </a:xfrm>
+          <a:prstGeom prst="rect">
+            <a:avLst/>
+          </a:prstGeom>
+          <a:noFill/>
+        </p:spPr>
+        <p:txBody>
+          <a:bodyPr wrap="square">
+            <a:spAutoFit/>
+          </a:bodyPr>
+          <a:lstStyle/>
+          <a:p>
+            <a:pPr>
+              <a:spcAft>
+                <a:spcPts val="600"/>
+              </a:spcAft>
+            </a:pPr>
+            <a:r>
+              <a:rPr sz="1100">
+                <a:solidFill>
+                  <a:srgbClr val="FF6B35"/>
+                </a:solidFill>
+                <a:latin typeface="Calibri"/>
+              </a:rPr>
+              <a:t>▸ </a:t>
+            </a:r>
+            <a:r>
+              <a:rPr sz="1100">
+                <a:solidFill>
+                  <a:srgbClr val="B0C4DE"/>
+                </a:solidFill>
+                <a:latin typeface="Calibri"/>
+              </a:rPr>
+              <a:t>Self-exciting point process</a:t>
+            </a:r>
+          </a:p>
+          <a:p>
+            <a:pPr>
+              <a:spcAft>
+                <a:spcPts val="600"/>
+              </a:spcAft>
+            </a:pPr>
+            <a:r>
+              <a:rPr sz="1100">
+                <a:solidFill>
+                  <a:srgbClr val="FF6B35"/>
+                </a:solidFill>
+                <a:latin typeface="Calibri"/>
+              </a:rPr>
+              <a:t>▸ </a:t>
+            </a:r>
+            <a:r>
+              <a:rPr sz="1100">
+                <a:solidFill>
+                  <a:srgbClr val="B0C4DE"/>
+                </a:solidFill>
+                <a:latin typeface="Calibri"/>
+              </a:rPr>
+              <a:t>Tracks temporal event density</a:t>
+            </a:r>
+          </a:p>
+          <a:p>
+            <a:pPr>
+              <a:spcAft>
+                <a:spcPts val="600"/>
+              </a:spcAft>
+            </a:pPr>
+            <a:r>
+              <a:rPr sz="1100">
+                <a:solidFill>
+                  <a:srgbClr val="FF6B35"/>
+                </a:solidFill>
+                <a:latin typeface="Calibri"/>
+              </a:rPr>
+              <a:t>▸ </a:t>
+            </a:r>
+            <a:r>
+              <a:rPr sz="1100">
+                <a:solidFill>
+                  <a:srgbClr val="B0C4DE"/>
+                </a:solidFill>
+                <a:latin typeface="Calibri"/>
+              </a:rPr>
+              <a:t>When events burst (accelerate), intensity spikes → probability boost</a:t>
+            </a:r>
+          </a:p>
+          <a:p>
+            <a:pPr>
+              <a:spcAft>
+                <a:spcPts val="600"/>
+              </a:spcAft>
+            </a:pPr>
+            <a:r>
+              <a:rPr sz="1100">
+                <a:solidFill>
+                  <a:srgbClr val="FF6B35"/>
+                </a:solidFill>
+                <a:latin typeface="Calibri"/>
+              </a:rPr>
+              <a:t>▸ </a:t>
+            </a:r>
+            <a:r>
+              <a:rPr sz="1100">
+                <a:solidFill>
+                  <a:srgbClr val="B0C4DE"/>
+                </a:solidFill>
+                <a:latin typeface="Calibri"/>
+              </a:rPr>
+              <a:t>O(1) per event via recursive formula</a:t>
+            </a:r>
+          </a:p>
+          <a:p>
+            <a:pPr>
+              <a:spcAft>
+                <a:spcPts val="600"/>
+              </a:spcAft>
+            </a:pPr>
+            <a:r>
+              <a:rPr sz="1100">
+                <a:solidFill>
+                  <a:srgbClr val="FF6B35"/>
+                </a:solidFill>
+                <a:latin typeface="Calibri"/>
+              </a:rPr>
+              <a:t>▸ </a:t>
+            </a:r>
+            <a:r>
+              <a:rPr sz="1100">
+                <a:solidFill>
+                  <a:srgbClr val="B0C4DE"/>
+                </a:solidFill>
+                <a:latin typeface="Calibri"/>
+              </a:rPr>
+              <a:t>Online parameter estimation via EMA (~20 events to adapt)</a:t>
+            </a:r>
+          </a:p>
+        </p:txBody>
+      </p:sp>
+      <p:sp>
+        <p:nvSpPr>
+          <p:cNvPr id="13" name="Rectangle 12"/>
+          <p:cNvSpPr/>
+          <p:nvPr/>
+        </p:nvSpPr>
+        <p:spPr>
+          <a:xfrm>
+            <a:off x="6035040" y="1051560"/>
+            <a:ext cx="2468880" cy="25400"/>
+          </a:xfrm>
+          <a:prstGeom prst="rect">
+            <a:avLst/>
+          </a:prstGeom>
+          <a:solidFill>
+            <a:srgbClr val="FF6B35"/>
+          </a:solidFill>
+          <a:ln>
+            <a:noFill/>
+          </a:ln>
+        </p:spPr>
+        <p:style>
+          <a:lnRef idx="1">
+            <a:schemeClr val="accent1"/>
+          </a:lnRef>
+          <a:fillRef idx="3">
+            <a:schemeClr val="accent1"/>
+          </a:fillRef>
+          <a:effectRef idx="2">
+            <a:schemeClr val="accent1"/>
+          </a:effectRef>
+          <a:fontRef idx="minor">
+            <a:schemeClr val="lt1"/>
+          </a:fontRef>
+        </p:style>
+        <p:txBody>
+          <a:bodyPr rtlCol="0" anchor="ctr"/>
+          <a:lstStyle/>
+          <a:p>
+            <a:pPr algn="ctr"/>
+          </a:p>
+        </p:txBody>
+      </p:sp>
+      <p:sp>
+        <p:nvSpPr>
+          <p:cNvPr id="14" name="TextBox 13"/>
+          <p:cNvSpPr txBox="1"/>
+          <p:nvPr/>
+        </p:nvSpPr>
+        <p:spPr>
+          <a:xfrm>
+            <a:off x="6035040" y="1120140"/>
+            <a:ext cx="2468880" cy="274320"/>
+          </a:xfrm>
+          <a:prstGeom prst="rect">
+            <a:avLst/>
+          </a:prstGeom>
+          <a:noFill/>
+        </p:spPr>
+        <p:txBody>
+          <a:bodyPr wrap="square">
+            <a:spAutoFit/>
+          </a:bodyPr>
+          <a:lstStyle/>
+          <a:p>
+            <a:pPr algn="l"/>
+            <a:r>
+              <a:rPr sz="1100" b="1">
+                <a:solidFill>
+                  <a:srgbClr val="FF6B35"/>
+                </a:solidFill>
+                <a:latin typeface="Calibri"/>
+              </a:rPr>
+              <a:t>CONFORMAL PREDICTION</a:t>
+            </a:r>
+          </a:p>
+        </p:txBody>
+      </p:sp>
+      <p:sp>
+        <p:nvSpPr>
+          <p:cNvPr id="15" name="TextBox 14"/>
+          <p:cNvSpPr txBox="1"/>
+          <p:nvPr/>
+        </p:nvSpPr>
+        <p:spPr>
+          <a:xfrm>
+            <a:off x="6035040" y="1371600"/>
+            <a:ext cx="2468880" cy="3200400"/>
+          </a:xfrm>
+          <a:prstGeom prst="rect">
+            <a:avLst/>
+          </a:prstGeom>
+          <a:noFill/>
+        </p:spPr>
+        <p:txBody>
+          <a:bodyPr wrap="square">
+            <a:spAutoFit/>
+          </a:bodyPr>
+          <a:lstStyle/>
+          <a:p>
+            <a:pPr>
+              <a:spcAft>
+                <a:spcPts val="600"/>
+              </a:spcAft>
+            </a:pPr>
+            <a:r>
+              <a:rPr sz="1100">
+                <a:solidFill>
+                  <a:srgbClr val="FF6B35"/>
+                </a:solidFill>
+                <a:latin typeface="Calibri"/>
+              </a:rPr>
+              <a:t>▸ </a:t>
+            </a:r>
+            <a:r>
+              <a:rPr sz="1100">
+                <a:solidFill>
+                  <a:srgbClr val="B0C4DE"/>
+                </a:solidFill>
+                <a:latin typeface="Calibri"/>
+              </a:rPr>
+              <a:t>Non-parametric prediction intervals</a:t>
+            </a:r>
+          </a:p>
+          <a:p>
+            <a:pPr>
+              <a:spcAft>
+                <a:spcPts val="600"/>
+              </a:spcAft>
+            </a:pPr>
+            <a:r>
+              <a:rPr sz="1100">
+                <a:solidFill>
+                  <a:srgbClr val="FF6B35"/>
+                </a:solidFill>
+                <a:latin typeface="Calibri"/>
+              </a:rPr>
+              <a:t>▸ </a:t>
+            </a:r>
+            <a:r>
+              <a:rPr sz="1100">
+                <a:solidFill>
+                  <a:srgbClr val="B0C4DE"/>
+                </a:solidFill>
+                <a:latin typeface="Calibri"/>
+              </a:rPr>
+              <a:t>No distributional assumptions</a:t>
+            </a:r>
+          </a:p>
+          <a:p>
+            <a:pPr>
+              <a:spcAft>
+                <a:spcPts val="600"/>
+              </a:spcAft>
+            </a:pPr>
+            <a:r>
+              <a:rPr sz="1100">
+                <a:solidFill>
+                  <a:srgbClr val="FF6B35"/>
+                </a:solidFill>
+                <a:latin typeface="Calibri"/>
+              </a:rPr>
+              <a:t>▸ </a:t>
+            </a:r>
+            <a:r>
+              <a:rPr sz="1100">
+                <a:solidFill>
+                  <a:srgbClr val="B0C4DE"/>
+                </a:solidFill>
+                <a:latin typeface="Calibri"/>
+              </a:rPr>
+              <a:t>Calibrated coverage guarantee (e.g. 90% of true values fall within bounds)</a:t>
+            </a:r>
+          </a:p>
+          <a:p>
+            <a:pPr>
+              <a:spcAft>
+                <a:spcPts val="600"/>
+              </a:spcAft>
+            </a:pPr>
+            <a:r>
+              <a:rPr sz="1100">
+                <a:solidFill>
+                  <a:srgbClr val="FF6B35"/>
+                </a:solidFill>
+                <a:latin typeface="Calibri"/>
+              </a:rPr>
+              <a:t>▸ </a:t>
+            </a:r>
+            <a:r>
+              <a:rPr sz="1100">
+                <a:solidFill>
+                  <a:srgbClr val="B0C4DE"/>
+                </a:solidFill>
+                <a:latin typeface="Calibri"/>
+              </a:rPr>
+              <a:t>Based on past forecast outcomes — self-calibrating</a:t>
+            </a:r>
+          </a:p>
+          <a:p>
+            <a:pPr>
+              <a:spcAft>
+                <a:spcPts val="600"/>
+              </a:spcAft>
+            </a:pPr>
+            <a:r>
+              <a:rPr sz="1100">
+                <a:solidFill>
+                  <a:srgbClr val="FF6B35"/>
+                </a:solidFill>
+                <a:latin typeface="Calibri"/>
+              </a:rPr>
+              <a:t>▸ </a:t>
+            </a:r>
+            <a:r>
+              <a:rPr sz="1100">
+                <a:solidFill>
+                  <a:srgbClr val="B0C4DE"/>
+                </a:solidFill>
+                <a:latin typeface="Calibri"/>
+              </a:rPr>
+              <a:t>Tells you when predictions are reliable vs uncertain</a:t>
+            </a:r>
+          </a:p>
+        </p:txBody>
+      </p:sp>
+      <p:sp>
+        <p:nvSpPr>
+          <p:cNvPr id="16" name="TextBox 15"/>
+          <p:cNvSpPr txBox="1"/>
+          <p:nvPr/>
+        </p:nvSpPr>
+        <p:spPr>
+          <a:xfrm>
+            <a:off x="548640" y="5486400"/>
+            <a:ext cx="7772400" cy="457200"/>
+          </a:xfrm>
+          <a:prstGeom prst="rect">
+            <a:avLst/>
+          </a:prstGeom>
+          <a:noFill/>
+        </p:spPr>
+        <p:txBody>
+          <a:bodyPr wrap="square">
+            <a:spAutoFit/>
+          </a:bodyPr>
+          <a:lstStyle/>
+          <a:p>
+            <a:pPr algn="l"/>
+            <a:r>
+              <a:rPr sz="1000" i="1">
+                <a:solidFill>
+                  <a:srgbClr val="787878"/>
+                </a:solidFill>
+                <a:latin typeface="Calibri"/>
+              </a:rPr>
+              <a:t>Reference: Complex Event Forecasting with Prediction Suffix Trees (Alevizos, Artikis, Paliouras — arXiv:2109.00287)</a:t>
+            </a:r>
+          </a:p>
+        </p:txBody>
+      </p:sp>
+      <p:sp>
+        <p:nvSpPr>
+          <p:cNvPr id="17" name="Rectangle 16"/>
+          <p:cNvSpPr/>
+          <p:nvPr/>
+        </p:nvSpPr>
+        <p:spPr>
+          <a:xfrm>
+            <a:off x="548640" y="5852160"/>
+            <a:ext cx="7772400" cy="548640"/>
+          </a:xfrm>
+          <a:prstGeom prst="rect">
+            <a:avLst/>
+          </a:prstGeom>
+          <a:solidFill>
+            <a:srgbClr val="14283C"/>
+          </a:solidFill>
+          <a:ln>
+            <a:noFill/>
+          </a:ln>
+        </p:spPr>
+        <p:style>
+          <a:lnRef idx="1">
+            <a:schemeClr val="accent1"/>
+          </a:lnRef>
+          <a:fillRef idx="3">
+            <a:schemeClr val="accent1"/>
+          </a:fillRef>
+          <a:effectRef idx="2">
+            <a:schemeClr val="accent1"/>
+          </a:effectRef>
+          <a:fontRef idx="minor">
+            <a:schemeClr val="lt1"/>
+          </a:fontRef>
+        </p:style>
+        <p:txBody>
+          <a:bodyPr rtlCol="0" anchor="ctr"/>
+          <a:lstStyle/>
+          <a:p>
+            <a:pPr algn="ctr"/>
+          </a:p>
+        </p:txBody>
+      </p:sp>
+      <p:sp>
+        <p:nvSpPr>
+          <p:cNvPr id="18" name="TextBox 17"/>
+          <p:cNvSpPr txBox="1"/>
+          <p:nvPr/>
+        </p:nvSpPr>
+        <p:spPr>
+          <a:xfrm>
+            <a:off x="731520" y="5897880"/>
+            <a:ext cx="7406640" cy="457200"/>
+          </a:xfrm>
+          <a:prstGeom prst="rect">
+            <a:avLst/>
+          </a:prstGeom>
+          <a:noFill/>
+        </p:spPr>
+        <p:txBody>
+          <a:bodyPr wrap="square">
+            <a:spAutoFit/>
+          </a:bodyPr>
+          <a:lstStyle/>
+          <a:p>
+            <a:pPr algn="l"/>
+            <a:r>
+              <a:rPr sz="1100">
+                <a:solidFill>
+                  <a:srgbClr val="B0C4DE"/>
+                </a:solidFill>
+                <a:latin typeface="Calibri"/>
+              </a:rPr>
+              <a:t>Performance: PST training 4.6M events/s  |  Single prediction 51 ns  |  Full PMC forecast 10.8 µs/event  |  Online learning 5.4M updates/s</a:t>
+            </a:r>
+          </a:p>
+        </p:txBody>
+      </p:sp>
+    </p:spTree>
+  </p:cSld>
+  <p:clrMapOvr>
+    <a:masterClrMapping/>
+  </p:clrMapOvr>
+</p:sld>
+</file>
+
 <file path=ppt/slides/slide2.xml><?xml version="1.0" encoding="utf-8"?>
 <p:sld xmlns:a="http://schemas.openxmlformats.org/drawingml/2006/main" xmlns:p="http://schemas.openxmlformats.org/presentationml/2006/main" xmlns:r="http://schemas.openxmlformats.org/officeDocument/2006/relationships">
   <p:cSld>
@@ -6485,52 +7502,183 @@
           </a:bodyPr>
           <a:lstStyle/>
           <a:p>
-            <a:pPr algn="l">
-              <a:defRPr sz="1200" b="0">
-                <a:solidFill>
-                  <a:srgbClr val="00E5A0"/>
+            <a:pPr marL="0" indent="0">
+              <a:buNone/>
+            </a:pPr>
+            <a:r>
+              <a:rPr lang="en-US" sz="1100" dirty="0">
+                <a:solidFill>
+                  <a:srgbClr val="6A9955"/>
                 </a:solidFill>
                 <a:latin typeface="Consolas"/>
-              </a:defRPr>
-            </a:pPr>
-            <a:r>
-              <a:t>  // Detect brute force → lateral movement → exfiltration</a:t>
-            </a:r>
-            <a:br/>
-            <a:r>
-              <a:t>  stream KillChain =</a:t>
-            </a:r>
-            <a:br/>
-            <a:r>
-              <a:t>      SEQ(FailedLogin bf+, LateralMove lm+, DataExfil ex)</a:t>
-            </a:r>
-            <a:br/>
-            <a:r>
-              <a:t>      .where(bf.target_host == lm.source_host)</a:t>
-            </a:r>
-            <a:br/>
-            <a:r>
-              <a:t>      .where(lm.dest_host == ex.source_host)</a:t>
-            </a:r>
-            <a:br/>
-            <a:r>
-              <a:t>      .within(4h)</a:t>
-            </a:r>
-            <a:br/>
-            <a:r>
-              <a:t>      .emit(attacker_ip: bf.source_ip,</a:t>
-            </a:r>
-            <a:br/>
-            <a:r>
-              <a:t>            failed_logins: count(bf), hops: count(lm),</a:t>
-            </a:r>
-            <a:br/>
-            <a:r>
-              <a:t>            exfil_bytes: sum(ex.bytes), severity: "critical")</a:t>
-            </a:r>
-            <a:br/>
-            <a:r>
-              <a:t>      .to(SIEMAlerts, IncidentResponse)</a:t>
+                <a:cs typeface="Consolas"/>
+              </a:rPr>
+              <a:t>// Detect brute force → lateral movement → exfiltration</a:t>
+            </a:r>
+          </a:p>
+          <a:p>
+            <a:pPr marL="0" indent="0">
+              <a:buNone/>
+            </a:pPr>
+            <a:r>
+              <a:rPr lang="en-US" sz="1100" dirty="0">
+                <a:solidFill>
+                  <a:srgbClr val="4EC9B0"/>
+                </a:solidFill>
+                <a:latin typeface="Consolas"/>
+                <a:cs typeface="Consolas"/>
+              </a:rPr>
+              <a:t>stream KillChain =</a:t>
+            </a:r>
+          </a:p>
+          <a:p>
+            <a:pPr marL="0" indent="0">
+              <a:buNone/>
+            </a:pPr>
+            <a:r>
+              <a:rPr lang="en-US" sz="1100" dirty="0">
+                <a:solidFill>
+                  <a:srgbClr val="4EC9B0"/>
+                </a:solidFill>
+                <a:latin typeface="Consolas"/>
+                <a:cs typeface="Consolas"/>
+              </a:rPr>
+              <a:t>    SEQ(FailedLogin bf+, LateralMove lm+, DataExfil ex)</a:t>
+            </a:r>
+          </a:p>
+          <a:p>
+            <a:pPr marL="0" indent="0">
+              <a:buNone/>
+            </a:pPr>
+            <a:r>
+              <a:rPr lang="en-US" sz="1100" dirty="0">
+                <a:solidFill>
+                  <a:srgbClr val="9CDBFE"/>
+                </a:solidFill>
+                <a:latin typeface="Consolas"/>
+                <a:cs typeface="Consolas"/>
+              </a:rPr>
+              <a:t>    .where(bf.target_host == lm.source_host</a:t>
+            </a:r>
+          </a:p>
+          <a:p>
+            <a:pPr marL="0" indent="0">
+              <a:buNone/>
+            </a:pPr>
+            <a:r>
+              <a:rPr lang="en-US" sz="1100" dirty="0">
+                <a:solidFill>
+                  <a:srgbClr val="C586C0"/>
+                </a:solidFill>
+                <a:latin typeface="Consolas"/>
+                <a:cs typeface="Consolas"/>
+              </a:rPr>
+              <a:t>       and lm.dest_host == ex.source_host)</a:t>
+            </a:r>
+          </a:p>
+          <a:p>
+            <a:pPr marL="0" indent="0">
+              <a:buNone/>
+            </a:pPr>
+            <a:r>
+              <a:rPr lang="en-US" sz="1100" dirty="0">
+                <a:solidFill>
+                  <a:srgbClr val="9CDBFE"/>
+                </a:solidFill>
+                <a:latin typeface="Consolas"/>
+                <a:cs typeface="Consolas"/>
+              </a:rPr>
+              <a:t>    .within(4h)</a:t>
+            </a:r>
+          </a:p>
+          <a:p>
+            <a:pPr marL="0" indent="0">
+              <a:buNone/>
+            </a:pPr>
+            <a:r>
+              <a:rPr lang="en-US" sz="1100" dirty="0">
+                <a:solidFill>
+                  <a:srgbClr val="9CDBFE"/>
+                </a:solidFill>
+                <a:latin typeface="Consolas"/>
+                <a:cs typeface="Consolas"/>
+              </a:rPr>
+              <a:t>    .forecast(confidence: 0.8, horizon: 10m, warmup: 500)</a:t>
+            </a:r>
+          </a:p>
+          <a:p>
+            <a:pPr marL="0" indent="0">
+              <a:buNone/>
+            </a:pPr>
+            <a:r>
+              <a:rPr lang="en-US" sz="1100" dirty="0">
+                <a:solidFill>
+                  <a:srgbClr val="9CDBFE"/>
+                </a:solidFill>
+                <a:latin typeface="Consolas"/>
+                <a:cs typeface="Consolas"/>
+              </a:rPr>
+              <a:t>    .where(forecast_probability &gt; 0.85)</a:t>
+            </a:r>
+          </a:p>
+          <a:p>
+            <a:pPr marL="0" indent="0">
+              <a:buNone/>
+            </a:pPr>
+            <a:r>
+              <a:rPr lang="en-US" sz="1100" dirty="0">
+                <a:solidFill>
+                  <a:srgbClr val="9CDBFE"/>
+                </a:solidFill>
+                <a:latin typeface="Consolas"/>
+                <a:cs typeface="Consolas"/>
+              </a:rPr>
+              <a:t>    .emit(attacker_ip: bf.source_ip,</a:t>
+            </a:r>
+          </a:p>
+          <a:p>
+            <a:pPr marL="0" indent="0">
+              <a:buNone/>
+            </a:pPr>
+            <a:r>
+              <a:rPr lang="en-US" sz="1100" dirty="0">
+                <a:solidFill>
+                  <a:srgbClr val="CED4DA"/>
+                </a:solidFill>
+                <a:latin typeface="Consolas"/>
+                <a:cs typeface="Consolas"/>
+              </a:rPr>
+              <a:t>          failed_logins: count(bf), hops: count(lm),</a:t>
+            </a:r>
+          </a:p>
+          <a:p>
+            <a:pPr marL="0" indent="0">
+              <a:buNone/>
+            </a:pPr>
+            <a:r>
+              <a:rPr lang="en-US" sz="1100" dirty="0">
+                <a:solidFill>
+                  <a:srgbClr val="CED4DA"/>
+                </a:solidFill>
+                <a:latin typeface="Consolas"/>
+                <a:cs typeface="Consolas"/>
+              </a:rPr>
+              <a:t>          exfil_bytes: sum(ex.bytes), severity: "critical")</a:t>
+            </a:r>
+          </a:p>
+          <a:p>
+            <a:pPr marL="0" indent="0">
+              <a:buNone/>
+            </a:pPr>
+            <a:r>
+              <a:rPr lang="en-US" sz="1100" dirty="0">
+                <a:solidFill>
+                  <a:srgbClr val="9CDBFE"/>
+                </a:solidFill>
+                <a:latin typeface="Consolas"/>
+                <a:cs typeface="Consolas"/>
+              </a:rPr>
+              <a:t>    .to(SIEMAlerts, IncidentResponse)</a:t>
             </a:r>
           </a:p>
         </p:txBody>
@@ -7788,15 +8936,14 @@
           </a:bodyPr>
           <a:lstStyle/>
           <a:p>
-            <a:pPr algn="l">
-              <a:defRPr sz="1000" b="1">
+            <a:pPr algn="l"/>
+            <a:r>
+              <a:rPr sz="1800" b="1">
                 <a:solidFill>
                   <a:srgbClr val="00B4D8"/>
                 </a:solidFill>
                 <a:latin typeface="Calibri"/>
-              </a:defRPr>
-            </a:pPr>
-            <a:r>
+              </a:rPr>
               <a:t>VARPULIS</a:t>
             </a:r>
           </a:p>
@@ -7804,50 +8951,14 @@
       </p:sp>
       <p:sp>
         <p:nvSpPr>
-          <p:cNvPr id="4" name="TextBox 3"/>
-          <p:cNvSpPr txBox="1"/>
-          <p:nvPr/>
-        </p:nvSpPr>
-        <p:spPr>
-          <a:xfrm>
-            <a:off x="548640" y="457200"/>
-            <a:ext cx="7772400" cy="548640"/>
-          </a:xfrm>
-          <a:prstGeom prst="rect">
-            <a:avLst/>
-          </a:prstGeom>
-          <a:noFill/>
-        </p:spPr>
-        <p:txBody>
-          <a:bodyPr wrap="square">
-            <a:spAutoFit/>
-          </a:bodyPr>
-          <a:lstStyle/>
-          <a:p>
-            <a:pPr algn="l">
-              <a:defRPr sz="2800" b="1">
-                <a:solidFill>
-                  <a:srgbClr val="FFFFFF"/>
-                </a:solidFill>
-                <a:latin typeface="Calibri"/>
-              </a:defRPr>
-            </a:pPr>
-            <a:r>
-              <a:t>Deterministic AI Correlation</a:t>
-            </a:r>
-          </a:p>
-        </p:txBody>
-      </p:sp>
-      <p:sp>
-        <p:nvSpPr>
-          <p:cNvPr id="5" name="Rectangle 4"/>
+          <p:cNvPr id="4" name="Rectangle 3"/>
           <p:cNvSpPr/>
           <p:nvPr/>
         </p:nvSpPr>
         <p:spPr>
           <a:xfrm>
-            <a:off x="548640" y="1051560"/>
-            <a:ext cx="1371600" cy="25400"/>
+            <a:off x="0" y="6821424"/>
+            <a:ext cx="9144000" cy="36576"/>
           </a:xfrm>
           <a:prstGeom prst="rect">
             <a:avLst/>
@@ -7883,14 +8994,14 @@
       </p:sp>
       <p:sp>
         <p:nvSpPr>
-          <p:cNvPr id="6" name="TextBox 5"/>
+          <p:cNvPr id="5" name="TextBox 4"/>
           <p:cNvSpPr txBox="1"/>
           <p:nvPr/>
         </p:nvSpPr>
         <p:spPr>
           <a:xfrm>
-            <a:off x="548640" y="1371600"/>
-            <a:ext cx="7772400" cy="731520"/>
+            <a:off x="548640" y="457200"/>
+            <a:ext cx="7772400" cy="548640"/>
           </a:xfrm>
           <a:prstGeom prst="rect">
             <a:avLst/>
@@ -7903,34 +9014,771 @@
           </a:bodyPr>
           <a:lstStyle/>
           <a:p>
-            <a:pPr algn="l">
-              <a:defRPr sz="1500" b="0">
+            <a:pPr algn="l"/>
+            <a:r>
+              <a:rPr sz="2800" b="1">
+                <a:solidFill>
+                  <a:srgbClr val="FFFFFF"/>
+                </a:solidFill>
+                <a:latin typeface="Calibri"/>
+              </a:rPr>
+              <a:t>Predict Attacks Before They Complete</a:t>
+            </a:r>
+          </a:p>
+        </p:txBody>
+      </p:sp>
+      <p:sp>
+        <p:nvSpPr>
+          <p:cNvPr id="6" name="Rectangle 5"/>
+          <p:cNvSpPr/>
+          <p:nvPr/>
+        </p:nvSpPr>
+        <p:spPr>
+          <a:xfrm>
+            <a:off x="548640" y="1005840"/>
+            <a:ext cx="1371600" cy="25400"/>
+          </a:xfrm>
+          <a:prstGeom prst="rect">
+            <a:avLst/>
+          </a:prstGeom>
+          <a:solidFill>
+            <a:srgbClr val="00B4D8"/>
+          </a:solidFill>
+          <a:ln>
+            <a:noFill/>
+          </a:ln>
+        </p:spPr>
+        <p:style>
+          <a:lnRef idx="1">
+            <a:schemeClr val="accent1"/>
+          </a:lnRef>
+          <a:fillRef idx="3">
+            <a:schemeClr val="accent1"/>
+          </a:fillRef>
+          <a:effectRef idx="2">
+            <a:schemeClr val="accent1"/>
+          </a:effectRef>
+          <a:fontRef idx="minor">
+            <a:schemeClr val="lt1"/>
+          </a:fontRef>
+        </p:style>
+        <p:txBody>
+          <a:bodyPr rtlCol="0" anchor="ctr"/>
+          <a:lstStyle/>
+          <a:p>
+            <a:pPr algn="ctr"/>
+          </a:p>
+        </p:txBody>
+      </p:sp>
+      <p:sp>
+        <p:nvSpPr>
+          <p:cNvPr id="7" name="TextBox 6"/>
+          <p:cNvSpPr txBox="1"/>
+          <p:nvPr/>
+        </p:nvSpPr>
+        <p:spPr>
+          <a:xfrm>
+            <a:off x="548640" y="1143000"/>
+            <a:ext cx="7772400" cy="548640"/>
+          </a:xfrm>
+          <a:prstGeom prst="rect">
+            <a:avLst/>
+          </a:prstGeom>
+          <a:noFill/>
+        </p:spPr>
+        <p:txBody>
+          <a:bodyPr wrap="square">
+            <a:spAutoFit/>
+          </a:bodyPr>
+          <a:lstStyle/>
+          <a:p>
+            <a:pPr algn="l"/>
+            <a:r>
+              <a:rPr sz="1400">
                 <a:solidFill>
                   <a:srgbClr val="B0C4DE"/>
                 </a:solidFill>
                 <a:latin typeface="Calibri"/>
-              </a:defRPr>
-            </a:pPr>
-            <a:r>
-              <a:t>Deterministic AI-powered correlation that scores event relationships</a:t>
-            </a:r>
-            <a:br/>
-            <a:r>
-              <a:t>without probabilistic models. Reproducible results, auditable decisions.</a:t>
-            </a:r>
-          </a:p>
-        </p:txBody>
-      </p:sp>
-      <p:sp>
-        <p:nvSpPr>
-          <p:cNvPr id="7" name="Rectangle 6"/>
+              </a:rPr>
+              <a:t>Varpulis doesn’t just detect completed attacks — it forecasts whether
+an in-progress attack sequence will reach its final stage, and alerts you
+while there’s still time to intervene.</a:t>
+            </a:r>
+          </a:p>
+        </p:txBody>
+      </p:sp>
+      <p:sp>
+        <p:nvSpPr>
+          <p:cNvPr id="8" name="Rectangle 7"/>
           <p:cNvSpPr/>
           <p:nvPr/>
         </p:nvSpPr>
         <p:spPr>
           <a:xfrm>
-            <a:off x="548640" y="2286000"/>
-            <a:ext cx="3657600" cy="25400"/>
+            <a:off x="548640" y="1920240"/>
+            <a:ext cx="1828800" cy="731520"/>
+          </a:xfrm>
+          <a:prstGeom prst="rect">
+            <a:avLst/>
+          </a:prstGeom>
+          <a:solidFill>
+            <a:srgbClr val="1B3A4B"/>
+          </a:solidFill>
+          <a:ln>
+            <a:noFill/>
+          </a:ln>
+        </p:spPr>
+        <p:style>
+          <a:lnRef idx="1">
+            <a:schemeClr val="accent1"/>
+          </a:lnRef>
+          <a:fillRef idx="3">
+            <a:schemeClr val="accent1"/>
+          </a:fillRef>
+          <a:effectRef idx="2">
+            <a:schemeClr val="accent1"/>
+          </a:effectRef>
+          <a:fontRef idx="minor">
+            <a:schemeClr val="lt1"/>
+          </a:fontRef>
+        </p:style>
+        <p:txBody>
+          <a:bodyPr rtlCol="0" anchor="ctr"/>
+          <a:lstStyle/>
+          <a:p>
+            <a:pPr algn="ctr"/>
+          </a:p>
+        </p:txBody>
+      </p:sp>
+      <p:sp>
+        <p:nvSpPr>
+          <p:cNvPr id="9" name="TextBox 8"/>
+          <p:cNvSpPr txBox="1"/>
+          <p:nvPr/>
+        </p:nvSpPr>
+        <p:spPr>
+          <a:xfrm>
+            <a:off x="548640" y="1965960"/>
+            <a:ext cx="1828800" cy="274320"/>
+          </a:xfrm>
+          <a:prstGeom prst="rect">
+            <a:avLst/>
+          </a:prstGeom>
+          <a:noFill/>
+        </p:spPr>
+        <p:txBody>
+          <a:bodyPr wrap="square">
+            <a:spAutoFit/>
+          </a:bodyPr>
+          <a:lstStyle/>
+          <a:p>
+            <a:pPr algn="ctr"/>
+            <a:r>
+              <a:rPr sz="1300" b="1">
+                <a:solidFill>
+                  <a:srgbClr val="FFFFFF"/>
+                </a:solidFill>
+                <a:latin typeface="Calibri"/>
+              </a:rPr>
+              <a:t>1. Recon</a:t>
+            </a:r>
+          </a:p>
+        </p:txBody>
+      </p:sp>
+      <p:sp>
+        <p:nvSpPr>
+          <p:cNvPr id="10" name="TextBox 9"/>
+          <p:cNvSpPr txBox="1"/>
+          <p:nvPr/>
+        </p:nvSpPr>
+        <p:spPr>
+          <a:xfrm>
+            <a:off x="548640" y="2240280"/>
+            <a:ext cx="1828800" cy="228600"/>
+          </a:xfrm>
+          <a:prstGeom prst="rect">
+            <a:avLst/>
+          </a:prstGeom>
+          <a:noFill/>
+        </p:spPr>
+        <p:txBody>
+          <a:bodyPr wrap="square">
+            <a:spAutoFit/>
+          </a:bodyPr>
+          <a:lstStyle/>
+          <a:p>
+            <a:pPr algn="ctr"/>
+            <a:r>
+              <a:rPr sz="1100">
+                <a:solidFill>
+                  <a:srgbClr val="B0C4DE"/>
+                </a:solidFill>
+                <a:latin typeface="Calibri"/>
+              </a:rPr>
+              <a:t>Detected</a:t>
+            </a:r>
+          </a:p>
+        </p:txBody>
+      </p:sp>
+      <p:sp>
+        <p:nvSpPr>
+          <p:cNvPr id="11" name="TextBox 10"/>
+          <p:cNvSpPr txBox="1"/>
+          <p:nvPr/>
+        </p:nvSpPr>
+        <p:spPr>
+          <a:xfrm>
+            <a:off x="548640" y="2423160"/>
+            <a:ext cx="1828800" cy="228600"/>
+          </a:xfrm>
+          <a:prstGeom prst="rect">
+            <a:avLst/>
+          </a:prstGeom>
+          <a:noFill/>
+        </p:spPr>
+        <p:txBody>
+          <a:bodyPr wrap="square">
+            <a:spAutoFit/>
+          </a:bodyPr>
+          <a:lstStyle/>
+          <a:p>
+            <a:pPr algn="ctr"/>
+            <a:r>
+              <a:rPr sz="1400" b="1">
+                <a:solidFill>
+                  <a:srgbClr val="4CAF50"/>
+                </a:solidFill>
+                <a:latin typeface="Calibri"/>
+              </a:rPr>
+              <a:t>p = 0.12</a:t>
+            </a:r>
+          </a:p>
+        </p:txBody>
+      </p:sp>
+      <p:sp>
+        <p:nvSpPr>
+          <p:cNvPr id="12" name="TextBox 11"/>
+          <p:cNvSpPr txBox="1"/>
+          <p:nvPr/>
+        </p:nvSpPr>
+        <p:spPr>
+          <a:xfrm>
+            <a:off x="2423160" y="2148840"/>
+            <a:ext cx="182880" cy="274320"/>
+          </a:xfrm>
+          <a:prstGeom prst="rect">
+            <a:avLst/>
+          </a:prstGeom>
+          <a:noFill/>
+        </p:spPr>
+        <p:txBody>
+          <a:bodyPr wrap="square">
+            <a:spAutoFit/>
+          </a:bodyPr>
+          <a:lstStyle/>
+          <a:p>
+            <a:pPr algn="ctr"/>
+            <a:r>
+              <a:rPr sz="2000">
+                <a:solidFill>
+                  <a:srgbClr val="B0C4DE"/>
+                </a:solidFill>
+                <a:latin typeface="Calibri"/>
+              </a:rPr>
+              <a:t>→</a:t>
+            </a:r>
+          </a:p>
+        </p:txBody>
+      </p:sp>
+      <p:sp>
+        <p:nvSpPr>
+          <p:cNvPr id="13" name="Rectangle 12"/>
+          <p:cNvSpPr/>
+          <p:nvPr/>
+        </p:nvSpPr>
+        <p:spPr>
+          <a:xfrm>
+            <a:off x="2651760" y="1920240"/>
+            <a:ext cx="1828800" cy="731520"/>
+          </a:xfrm>
+          <a:prstGeom prst="rect">
+            <a:avLst/>
+          </a:prstGeom>
+          <a:solidFill>
+            <a:srgbClr val="1B3A4B"/>
+          </a:solidFill>
+          <a:ln>
+            <a:noFill/>
+          </a:ln>
+        </p:spPr>
+        <p:style>
+          <a:lnRef idx="1">
+            <a:schemeClr val="accent1"/>
+          </a:lnRef>
+          <a:fillRef idx="3">
+            <a:schemeClr val="accent1"/>
+          </a:fillRef>
+          <a:effectRef idx="2">
+            <a:schemeClr val="accent1"/>
+          </a:effectRef>
+          <a:fontRef idx="minor">
+            <a:schemeClr val="lt1"/>
+          </a:fontRef>
+        </p:style>
+        <p:txBody>
+          <a:bodyPr rtlCol="0" anchor="ctr"/>
+          <a:lstStyle/>
+          <a:p>
+            <a:pPr algn="ctr"/>
+          </a:p>
+        </p:txBody>
+      </p:sp>
+      <p:sp>
+        <p:nvSpPr>
+          <p:cNvPr id="14" name="TextBox 13"/>
+          <p:cNvSpPr txBox="1"/>
+          <p:nvPr/>
+        </p:nvSpPr>
+        <p:spPr>
+          <a:xfrm>
+            <a:off x="2651760" y="1965960"/>
+            <a:ext cx="1828800" cy="274320"/>
+          </a:xfrm>
+          <a:prstGeom prst="rect">
+            <a:avLst/>
+          </a:prstGeom>
+          <a:noFill/>
+        </p:spPr>
+        <p:txBody>
+          <a:bodyPr wrap="square">
+            <a:spAutoFit/>
+          </a:bodyPr>
+          <a:lstStyle/>
+          <a:p>
+            <a:pPr algn="ctr"/>
+            <a:r>
+              <a:rPr sz="1300" b="1">
+                <a:solidFill>
+                  <a:srgbClr val="FFFFFF"/>
+                </a:solidFill>
+                <a:latin typeface="Calibri"/>
+              </a:rPr>
+              <a:t>2. Brute Force</a:t>
+            </a:r>
+          </a:p>
+        </p:txBody>
+      </p:sp>
+      <p:sp>
+        <p:nvSpPr>
+          <p:cNvPr id="15" name="TextBox 14"/>
+          <p:cNvSpPr txBox="1"/>
+          <p:nvPr/>
+        </p:nvSpPr>
+        <p:spPr>
+          <a:xfrm>
+            <a:off x="2651760" y="2240280"/>
+            <a:ext cx="1828800" cy="228600"/>
+          </a:xfrm>
+          <a:prstGeom prst="rect">
+            <a:avLst/>
+          </a:prstGeom>
+          <a:noFill/>
+        </p:spPr>
+        <p:txBody>
+          <a:bodyPr wrap="square">
+            <a:spAutoFit/>
+          </a:bodyPr>
+          <a:lstStyle/>
+          <a:p>
+            <a:pPr algn="ctr"/>
+            <a:r>
+              <a:rPr sz="1100">
+                <a:solidFill>
+                  <a:srgbClr val="B0C4DE"/>
+                </a:solidFill>
+                <a:latin typeface="Calibri"/>
+              </a:rPr>
+              <a:t>In progress</a:t>
+            </a:r>
+          </a:p>
+        </p:txBody>
+      </p:sp>
+      <p:sp>
+        <p:nvSpPr>
+          <p:cNvPr id="16" name="TextBox 15"/>
+          <p:cNvSpPr txBox="1"/>
+          <p:nvPr/>
+        </p:nvSpPr>
+        <p:spPr>
+          <a:xfrm>
+            <a:off x="2651760" y="2423160"/>
+            <a:ext cx="1828800" cy="228600"/>
+          </a:xfrm>
+          <a:prstGeom prst="rect">
+            <a:avLst/>
+          </a:prstGeom>
+          <a:noFill/>
+        </p:spPr>
+        <p:txBody>
+          <a:bodyPr wrap="square">
+            <a:spAutoFit/>
+          </a:bodyPr>
+          <a:lstStyle/>
+          <a:p>
+            <a:pPr algn="ctr"/>
+            <a:r>
+              <a:rPr sz="1400" b="1">
+                <a:solidFill>
+                  <a:srgbClr val="4CAF50"/>
+                </a:solidFill>
+                <a:latin typeface="Calibri"/>
+              </a:rPr>
+              <a:t>p = 0.45</a:t>
+            </a:r>
+          </a:p>
+        </p:txBody>
+      </p:sp>
+      <p:sp>
+        <p:nvSpPr>
+          <p:cNvPr id="17" name="TextBox 16"/>
+          <p:cNvSpPr txBox="1"/>
+          <p:nvPr/>
+        </p:nvSpPr>
+        <p:spPr>
+          <a:xfrm>
+            <a:off x="4526280" y="2148840"/>
+            <a:ext cx="182880" cy="274320"/>
+          </a:xfrm>
+          <a:prstGeom prst="rect">
+            <a:avLst/>
+          </a:prstGeom>
+          <a:noFill/>
+        </p:spPr>
+        <p:txBody>
+          <a:bodyPr wrap="square">
+            <a:spAutoFit/>
+          </a:bodyPr>
+          <a:lstStyle/>
+          <a:p>
+            <a:pPr algn="ctr"/>
+            <a:r>
+              <a:rPr sz="2000">
+                <a:solidFill>
+                  <a:srgbClr val="B0C4DE"/>
+                </a:solidFill>
+                <a:latin typeface="Calibri"/>
+              </a:rPr>
+              <a:t>→</a:t>
+            </a:r>
+          </a:p>
+        </p:txBody>
+      </p:sp>
+      <p:sp>
+        <p:nvSpPr>
+          <p:cNvPr id="18" name="Rectangle 17"/>
+          <p:cNvSpPr/>
+          <p:nvPr/>
+        </p:nvSpPr>
+        <p:spPr>
+          <a:xfrm>
+            <a:off x="4754880" y="1920240"/>
+            <a:ext cx="1828800" cy="731520"/>
+          </a:xfrm>
+          <a:prstGeom prst="rect">
+            <a:avLst/>
+          </a:prstGeom>
+          <a:solidFill>
+            <a:srgbClr val="4A206A"/>
+          </a:solidFill>
+          <a:ln>
+            <a:noFill/>
+          </a:ln>
+        </p:spPr>
+        <p:style>
+          <a:lnRef idx="1">
+            <a:schemeClr val="accent1"/>
+          </a:lnRef>
+          <a:fillRef idx="3">
+            <a:schemeClr val="accent1"/>
+          </a:fillRef>
+          <a:effectRef idx="2">
+            <a:schemeClr val="accent1"/>
+          </a:effectRef>
+          <a:fontRef idx="minor">
+            <a:schemeClr val="lt1"/>
+          </a:fontRef>
+        </p:style>
+        <p:txBody>
+          <a:bodyPr rtlCol="0" anchor="ctr"/>
+          <a:lstStyle/>
+          <a:p>
+            <a:pPr algn="ctr"/>
+          </a:p>
+        </p:txBody>
+      </p:sp>
+      <p:sp>
+        <p:nvSpPr>
+          <p:cNvPr id="19" name="TextBox 18"/>
+          <p:cNvSpPr txBox="1"/>
+          <p:nvPr/>
+        </p:nvSpPr>
+        <p:spPr>
+          <a:xfrm>
+            <a:off x="4754880" y="1965960"/>
+            <a:ext cx="1828800" cy="274320"/>
+          </a:xfrm>
+          <a:prstGeom prst="rect">
+            <a:avLst/>
+          </a:prstGeom>
+          <a:noFill/>
+        </p:spPr>
+        <p:txBody>
+          <a:bodyPr wrap="square">
+            <a:spAutoFit/>
+          </a:bodyPr>
+          <a:lstStyle/>
+          <a:p>
+            <a:pPr algn="ctr"/>
+            <a:r>
+              <a:rPr sz="1300" b="1">
+                <a:solidFill>
+                  <a:srgbClr val="FFFFFF"/>
+                </a:solidFill>
+                <a:latin typeface="Calibri"/>
+              </a:rPr>
+              <a:t>3. Lateral Move</a:t>
+            </a:r>
+          </a:p>
+        </p:txBody>
+      </p:sp>
+      <p:sp>
+        <p:nvSpPr>
+          <p:cNvPr id="20" name="TextBox 19"/>
+          <p:cNvSpPr txBox="1"/>
+          <p:nvPr/>
+        </p:nvSpPr>
+        <p:spPr>
+          <a:xfrm>
+            <a:off x="4754880" y="2240280"/>
+            <a:ext cx="1828800" cy="228600"/>
+          </a:xfrm>
+          <a:prstGeom prst="rect">
+            <a:avLst/>
+          </a:prstGeom>
+          <a:noFill/>
+        </p:spPr>
+        <p:txBody>
+          <a:bodyPr wrap="square">
+            <a:spAutoFit/>
+          </a:bodyPr>
+          <a:lstStyle/>
+          <a:p>
+            <a:pPr algn="ctr"/>
+            <a:r>
+              <a:rPr sz="1100">
+                <a:solidFill>
+                  <a:srgbClr val="B0C4DE"/>
+                </a:solidFill>
+                <a:latin typeface="Calibri"/>
+              </a:rPr>
+              <a:t>Predicted</a:t>
+            </a:r>
+          </a:p>
+        </p:txBody>
+      </p:sp>
+      <p:sp>
+        <p:nvSpPr>
+          <p:cNvPr id="21" name="TextBox 20"/>
+          <p:cNvSpPr txBox="1"/>
+          <p:nvPr/>
+        </p:nvSpPr>
+        <p:spPr>
+          <a:xfrm>
+            <a:off x="4754880" y="2423160"/>
+            <a:ext cx="1828800" cy="228600"/>
+          </a:xfrm>
+          <a:prstGeom prst="rect">
+            <a:avLst/>
+          </a:prstGeom>
+          <a:noFill/>
+        </p:spPr>
+        <p:txBody>
+          <a:bodyPr wrap="square">
+            <a:spAutoFit/>
+          </a:bodyPr>
+          <a:lstStyle/>
+          <a:p>
+            <a:pPr algn="ctr"/>
+            <a:r>
+              <a:rPr sz="1400" b="1">
+                <a:solidFill>
+                  <a:srgbClr val="F44336"/>
+                </a:solidFill>
+                <a:latin typeface="Calibri"/>
+              </a:rPr>
+              <a:t>p = 0.87</a:t>
+            </a:r>
+          </a:p>
+        </p:txBody>
+      </p:sp>
+      <p:sp>
+        <p:nvSpPr>
+          <p:cNvPr id="22" name="TextBox 21"/>
+          <p:cNvSpPr txBox="1"/>
+          <p:nvPr/>
+        </p:nvSpPr>
+        <p:spPr>
+          <a:xfrm>
+            <a:off x="6629400" y="2148840"/>
+            <a:ext cx="182880" cy="274320"/>
+          </a:xfrm>
+          <a:prstGeom prst="rect">
+            <a:avLst/>
+          </a:prstGeom>
+          <a:noFill/>
+        </p:spPr>
+        <p:txBody>
+          <a:bodyPr wrap="square">
+            <a:spAutoFit/>
+          </a:bodyPr>
+          <a:lstStyle/>
+          <a:p>
+            <a:pPr algn="ctr"/>
+            <a:r>
+              <a:rPr sz="2000">
+                <a:solidFill>
+                  <a:srgbClr val="B0C4DE"/>
+                </a:solidFill>
+                <a:latin typeface="Calibri"/>
+              </a:rPr>
+              <a:t>→</a:t>
+            </a:r>
+          </a:p>
+        </p:txBody>
+      </p:sp>
+      <p:sp>
+        <p:nvSpPr>
+          <p:cNvPr id="23" name="Rectangle 22"/>
+          <p:cNvSpPr/>
+          <p:nvPr/>
+        </p:nvSpPr>
+        <p:spPr>
+          <a:xfrm>
+            <a:off x="6858000" y="1920240"/>
+            <a:ext cx="1828800" cy="731520"/>
+          </a:xfrm>
+          <a:prstGeom prst="rect">
+            <a:avLst/>
+          </a:prstGeom>
+          <a:solidFill>
+            <a:srgbClr val="2A1212"/>
+          </a:solidFill>
+          <a:ln>
+            <a:noFill/>
+          </a:ln>
+        </p:spPr>
+        <p:style>
+          <a:lnRef idx="1">
+            <a:schemeClr val="accent1"/>
+          </a:lnRef>
+          <a:fillRef idx="3">
+            <a:schemeClr val="accent1"/>
+          </a:fillRef>
+          <a:effectRef idx="2">
+            <a:schemeClr val="accent1"/>
+          </a:effectRef>
+          <a:fontRef idx="minor">
+            <a:schemeClr val="lt1"/>
+          </a:fontRef>
+        </p:style>
+        <p:txBody>
+          <a:bodyPr rtlCol="0" anchor="ctr"/>
+          <a:lstStyle/>
+          <a:p>
+            <a:pPr algn="ctr"/>
+          </a:p>
+        </p:txBody>
+      </p:sp>
+      <p:sp>
+        <p:nvSpPr>
+          <p:cNvPr id="24" name="TextBox 23"/>
+          <p:cNvSpPr txBox="1"/>
+          <p:nvPr/>
+        </p:nvSpPr>
+        <p:spPr>
+          <a:xfrm>
+            <a:off x="6858000" y="1965960"/>
+            <a:ext cx="1828800" cy="274320"/>
+          </a:xfrm>
+          <a:prstGeom prst="rect">
+            <a:avLst/>
+          </a:prstGeom>
+          <a:noFill/>
+        </p:spPr>
+        <p:txBody>
+          <a:bodyPr wrap="square">
+            <a:spAutoFit/>
+          </a:bodyPr>
+          <a:lstStyle/>
+          <a:p>
+            <a:pPr algn="ctr"/>
+            <a:r>
+              <a:rPr sz="1300" b="1">
+                <a:solidFill>
+                  <a:srgbClr val="FFFFFF"/>
+                </a:solidFill>
+                <a:latin typeface="Calibri"/>
+              </a:rPr>
+              <a:t>4. Exfiltration</a:t>
+            </a:r>
+          </a:p>
+        </p:txBody>
+      </p:sp>
+      <p:sp>
+        <p:nvSpPr>
+          <p:cNvPr id="25" name="TextBox 24"/>
+          <p:cNvSpPr txBox="1"/>
+          <p:nvPr/>
+        </p:nvSpPr>
+        <p:spPr>
+          <a:xfrm>
+            <a:off x="6858000" y="2240280"/>
+            <a:ext cx="1828800" cy="228600"/>
+          </a:xfrm>
+          <a:prstGeom prst="rect">
+            <a:avLst/>
+          </a:prstGeom>
+          <a:noFill/>
+        </p:spPr>
+        <p:txBody>
+          <a:bodyPr wrap="square">
+            <a:spAutoFit/>
+          </a:bodyPr>
+          <a:lstStyle/>
+          <a:p>
+            <a:pPr algn="ctr"/>
+            <a:r>
+              <a:rPr sz="1100">
+                <a:solidFill>
+                  <a:srgbClr val="B0C4DE"/>
+                </a:solidFill>
+                <a:latin typeface="Calibri"/>
+              </a:rPr>
+              <a:t>Blocked</a:t>
+            </a:r>
+          </a:p>
+        </p:txBody>
+      </p:sp>
+      <p:sp>
+        <p:nvSpPr>
+          <p:cNvPr id="26" name="Rectangle 25"/>
+          <p:cNvSpPr/>
+          <p:nvPr/>
+        </p:nvSpPr>
+        <p:spPr>
+          <a:xfrm>
+            <a:off x="548640" y="2926080"/>
+            <a:ext cx="3840480" cy="25400"/>
           </a:xfrm>
           <a:prstGeom prst="rect">
             <a:avLst/>
@@ -7966,14 +9814,14 @@
       </p:sp>
       <p:sp>
         <p:nvSpPr>
-          <p:cNvPr id="8" name="TextBox 7"/>
+          <p:cNvPr id="27" name="TextBox 26"/>
           <p:cNvSpPr txBox="1"/>
           <p:nvPr/>
         </p:nvSpPr>
         <p:spPr>
           <a:xfrm>
-            <a:off x="548640" y="2362200"/>
-            <a:ext cx="3657600" cy="274320"/>
+            <a:off x="548640" y="3002280"/>
+            <a:ext cx="3840480" cy="274320"/>
           </a:xfrm>
           <a:prstGeom prst="rect">
             <a:avLst/>
@@ -7986,30 +9834,29 @@
           </a:bodyPr>
           <a:lstStyle/>
           <a:p>
-            <a:pPr algn="l">
-              <a:defRPr sz="1000" b="1">
+            <a:pPr algn="l"/>
+            <a:r>
+              <a:rPr sz="1300" b="1">
                 <a:solidFill>
                   <a:srgbClr val="FF6B35"/>
                 </a:solidFill>
                 <a:latin typeface="Calibri"/>
-              </a:defRPr>
-            </a:pPr>
-            <a:r>
-              <a:t>HOW IT WORKS</a:t>
-            </a:r>
-          </a:p>
-        </p:txBody>
-      </p:sp>
-      <p:sp>
-        <p:nvSpPr>
-          <p:cNvPr id="9" name="TextBox 8"/>
+              </a:rPr>
+              <a:t>WHAT IT DOES</a:t>
+            </a:r>
+          </a:p>
+        </p:txBody>
+      </p:sp>
+      <p:sp>
+        <p:nvSpPr>
+          <p:cNvPr id="28" name="TextBox 27"/>
           <p:cNvSpPr txBox="1"/>
           <p:nvPr/>
         </p:nvSpPr>
         <p:spPr>
           <a:xfrm>
-            <a:off x="548640" y="2743200"/>
-            <a:ext cx="3840480" cy="2286000"/>
+            <a:off x="548640" y="3246120"/>
+            <a:ext cx="3840480" cy="1828800"/>
           </a:xfrm>
           <a:prstGeom prst="rect">
             <a:avLst/>
@@ -8043,7 +9890,7 @@
                 </a:solidFill>
                 <a:latin typeface="Calibri"/>
               </a:rPr>
-              <a:t>Multi-head attention over event embeddings</a:t>
+              <a:t>Learns your event patterns from the live stream — no training data needed</a:t>
             </a:r>
           </a:p>
           <a:p>
@@ -8068,7 +9915,7 @@
                 </a:solidFill>
                 <a:latin typeface="Calibri"/>
               </a:rPr>
-              <a:t>Correlation scores based on field similarity</a:t>
+              <a:t>After seeing the first stages of an attack, calculates the probability it will complete</a:t>
             </a:r>
           </a:p>
           <a:p>
@@ -8093,7 +9940,7 @@
                 </a:solidFill>
                 <a:latin typeface="Calibri"/>
               </a:rPr>
-              <a:t>Deterministic: same input = same output, always</a:t>
+              <a:t>Gives you a confidence score: how certain the prediction is</a:t>
             </a:r>
           </a:p>
           <a:p>
@@ -8118,20 +9965,20 @@
                 </a:solidFill>
                 <a:latin typeface="Calibri"/>
               </a:rPr>
-              <a:t>No training data required — works on day one</a:t>
-            </a:r>
-          </a:p>
-        </p:txBody>
-      </p:sp>
-      <p:sp>
-        <p:nvSpPr>
-          <p:cNvPr id="10" name="Rectangle 9"/>
+              <a:t>Alerts fire at a probability threshold you choose — before the final stage happens</a:t>
+            </a:r>
+          </a:p>
+        </p:txBody>
+      </p:sp>
+      <p:sp>
+        <p:nvSpPr>
+          <p:cNvPr id="29" name="Rectangle 28"/>
           <p:cNvSpPr/>
           <p:nvPr/>
         </p:nvSpPr>
         <p:spPr>
           <a:xfrm>
-            <a:off x="4754880" y="2286000"/>
+            <a:off x="4754880" y="2926080"/>
             <a:ext cx="3931920" cy="25400"/>
           </a:xfrm>
           <a:prstGeom prst="rect">
@@ -8168,13 +10015,13 @@
       </p:sp>
       <p:sp>
         <p:nvSpPr>
-          <p:cNvPr id="11" name="TextBox 10"/>
+          <p:cNvPr id="30" name="TextBox 29"/>
           <p:cNvSpPr txBox="1"/>
           <p:nvPr/>
         </p:nvSpPr>
         <p:spPr>
           <a:xfrm>
-            <a:off x="4754880" y="2362200"/>
+            <a:off x="4754880" y="3002280"/>
             <a:ext cx="3931920" cy="274320"/>
           </a:xfrm>
           <a:prstGeom prst="rect">
@@ -8188,30 +10035,29 @@
           </a:bodyPr>
           <a:lstStyle/>
           <a:p>
-            <a:pPr algn="l">
-              <a:defRPr sz="1000" b="1">
+            <a:pPr algn="l"/>
+            <a:r>
+              <a:rPr sz="1300" b="1">
                 <a:solidFill>
                   <a:srgbClr val="FF6B35"/>
                 </a:solidFill>
                 <a:latin typeface="Calibri"/>
-              </a:defRPr>
-            </a:pPr>
-            <a:r>
-              <a:t>SECURITY USE CASES</a:t>
-            </a:r>
-          </a:p>
-        </p:txBody>
-      </p:sp>
-      <p:sp>
-        <p:nvSpPr>
-          <p:cNvPr id="12" name="TextBox 11"/>
+              </a:rPr>
+              <a:t>WHY IT MATTERS</a:t>
+            </a:r>
+          </a:p>
+        </p:txBody>
+      </p:sp>
+      <p:sp>
+        <p:nvSpPr>
+          <p:cNvPr id="31" name="TextBox 30"/>
           <p:cNvSpPr txBox="1"/>
           <p:nvPr/>
         </p:nvSpPr>
         <p:spPr>
           <a:xfrm>
-            <a:off x="4754880" y="2743200"/>
-            <a:ext cx="3931920" cy="2286000"/>
+            <a:off x="4754880" y="3246120"/>
+            <a:ext cx="3931920" cy="1828800"/>
           </a:xfrm>
           <a:prstGeom prst="rect">
             <a:avLst/>
@@ -8245,7 +10091,7 @@
                 </a:solidFill>
                 <a:latin typeface="Calibri"/>
               </a:rPr>
-              <a:t>Correlate events across firewalls, endpoints, and identity systems</a:t>
+              <a:t>Shift from reactive detection to proactive prevention</a:t>
             </a:r>
           </a:p>
           <a:p>
@@ -8270,7 +10116,7 @@
                 </a:solidFill>
                 <a:latin typeface="Calibri"/>
               </a:rPr>
-              <a:t>Detect anomalous event sequences without training</a:t>
+              <a:t>Prioritize your SOC queue: high-probability attacks surface first</a:t>
             </a:r>
           </a:p>
           <a:p>
@@ -8295,7 +10141,7 @@
                 </a:solidFill>
                 <a:latin typeface="Calibri"/>
               </a:rPr>
-              <a:t>Explainable alerting: correlation scores show why events were linked</a:t>
+              <a:t>Intervene at stage 2 instead of investigating after exfiltration</a:t>
             </a:r>
           </a:p>
           <a:p>
@@ -8320,21 +10166,21 @@
                 </a:solidFill>
                 <a:latin typeface="Calibri"/>
               </a:rPr>
-              <a:t>Augment rule-based detection with pattern-aware scoring</a:t>
-            </a:r>
-          </a:p>
-        </p:txBody>
-      </p:sp>
-      <p:sp>
-        <p:nvSpPr>
-          <p:cNvPr id="13" name="Rectangle 12"/>
+              <a:t>Adapts automatically as attacker techniques evolve — no model retraining</a:t>
+            </a:r>
+          </a:p>
+        </p:txBody>
+      </p:sp>
+      <p:sp>
+        <p:nvSpPr>
+          <p:cNvPr id="32" name="Rectangle 31"/>
           <p:cNvSpPr/>
           <p:nvPr/>
         </p:nvSpPr>
         <p:spPr>
           <a:xfrm>
-            <a:off x="548640" y="5029200"/>
-            <a:ext cx="7772400" cy="731520"/>
+            <a:off x="548640" y="5120640"/>
+            <a:ext cx="7772400" cy="640080"/>
           </a:xfrm>
           <a:prstGeom prst="rect">
             <a:avLst/>
@@ -8370,14 +10216,14 @@
       </p:sp>
       <p:sp>
         <p:nvSpPr>
-          <p:cNvPr id="14" name="TextBox 13"/>
+          <p:cNvPr id="33" name="TextBox 32"/>
           <p:cNvSpPr txBox="1"/>
           <p:nvPr/>
         </p:nvSpPr>
         <p:spPr>
           <a:xfrm>
-            <a:off x="731520" y="5120640"/>
-            <a:ext cx="7315200" cy="548640"/>
+            <a:off x="731520" y="5166360"/>
+            <a:ext cx="7406640" cy="548640"/>
           </a:xfrm>
           <a:prstGeom prst="rect">
             <a:avLst/>
@@ -8390,20 +10236,16 @@
           </a:bodyPr>
           <a:lstStyle/>
           <a:p>
-            <a:pPr algn="l">
-              <a:defRPr sz="1300" b="0">
-                <a:solidFill>
-                  <a:srgbClr val="FF6B35"/>
-                </a:solidFill>
-                <a:latin typeface="Calibri"/>
-              </a:defRPr>
-            </a:pPr>
-            <a:r>
-              <a:t>Unlike ML-based UEBA, Varpulis attention is deterministic and auditable.</a:t>
-            </a:r>
-            <a:br/>
-            <a:r>
-              <a:t>No black-box models. No training drift. No false positive storms from retraining.</a:t>
+            <a:pPr algn="l"/>
+            <a:r>
+              <a:rPr sz="1200">
+                <a:solidFill>
+                  <a:srgbClr val="B0C4DE"/>
+                </a:solidFill>
+                <a:latin typeface="Calibri"/>
+              </a:rPr>
+              <a:t>One line in your detection rule enables forecasting:   .forecast(confidence: 0.8, horizon: 10m)
+The engine does the rest — learning, predicting, and alerting — all in real time.</a:t>
             </a:r>
           </a:p>
         </p:txBody>
@@ -10043,7 +11885,7 @@
                 </a:solidFill>
                 <a:latin typeface="Calibri"/>
               </a:rPr>
-              <a:t>Analyst productivity: readable rules mean faster rule authoring and review cycles</a:t>
+              <a:t>Predictive forecasting: PST + Hawkes + conformal prediction for proactive threat alerting</a:t>
             </a:r>
           </a:p>
         </p:txBody>

</xml_diff>